<commit_message>
Updated PPTX Presentation files
</commit_message>
<xml_diff>
--- a/DocsPhase1_2_3/Nikpour-Aryabod_92130892_DLBCSPJWD01_P2_S.pptx
+++ b/DocsPhase1_2_3/Nikpour-Aryabod_92130892_DLBCSPJWD01_P2_S.pptx
@@ -224,7 +224,7 @@
           <a:p>
             <a:fld id="{7C0AA17F-CB06-445B-ACD3-321E84E51A80}" type="datetimeFigureOut">
               <a:rPr lang="en-US" smtClean="0"/>
-              <a:t>8/22/2025</a:t>
+              <a:t>8/23/2025</a:t>
             </a:fld>
             <a:endParaRPr lang="en-US" dirty="0"/>
           </a:p>
@@ -401,7 +401,7 @@
           <a:p>
             <a:fld id="{B06141C0-BF72-4A20-AFA7-D05563D549B7}" type="datetimeFigureOut">
               <a:rPr lang="en-US" smtClean="0"/>
-              <a:t>8/22/2025</a:t>
+              <a:t>8/23/2025</a:t>
             </a:fld>
             <a:endParaRPr lang="en-US" dirty="0"/>
           </a:p>
@@ -854,7 +854,7 @@
           <a:p>
             <a:fld id="{984B7D2A-0DF8-424B-9572-B79AEBB2D9DC}" type="datetimeFigureOut">
               <a:rPr lang="en-US" noProof="0" smtClean="0"/>
-              <a:t>8/22/2025</a:t>
+              <a:t>8/23/2025</a:t>
             </a:fld>
             <a:endParaRPr lang="en-US" noProof="0" dirty="0"/>
           </a:p>
@@ -1181,7 +1181,7 @@
           <a:p>
             <a:fld id="{984B7D2A-0DF8-424B-9572-B79AEBB2D9DC}" type="datetimeFigureOut">
               <a:rPr lang="en-US" noProof="0" smtClean="0"/>
-              <a:t>8/22/2025</a:t>
+              <a:t>8/23/2025</a:t>
             </a:fld>
             <a:endParaRPr lang="en-US" noProof="0" dirty="0"/>
           </a:p>
@@ -1342,7 +1342,7 @@
           <a:p>
             <a:fld id="{984B7D2A-0DF8-424B-9572-B79AEBB2D9DC}" type="datetimeFigureOut">
               <a:rPr lang="en-US" noProof="0" smtClean="0"/>
-              <a:t>8/22/2025</a:t>
+              <a:t>8/23/2025</a:t>
             </a:fld>
             <a:endParaRPr lang="en-US" noProof="0" dirty="0"/>
           </a:p>
@@ -1470,7 +1470,7 @@
           <a:p>
             <a:fld id="{984B7D2A-0DF8-424B-9572-B79AEBB2D9DC}" type="datetimeFigureOut">
               <a:rPr lang="en-US" noProof="0" smtClean="0"/>
-              <a:t>8/22/2025</a:t>
+              <a:t>8/23/2025</a:t>
             </a:fld>
             <a:endParaRPr lang="en-US" noProof="0" dirty="0"/>
           </a:p>
@@ -1789,7 +1789,7 @@
           <a:p>
             <a:fld id="{984B7D2A-0DF8-424B-9572-B79AEBB2D9DC}" type="datetimeFigureOut">
               <a:rPr lang="en-US" noProof="0" smtClean="0"/>
-              <a:t>8/22/2025</a:t>
+              <a:t>8/23/2025</a:t>
             </a:fld>
             <a:endParaRPr lang="en-US" noProof="0" dirty="0"/>
           </a:p>
@@ -2085,7 +2085,7 @@
           <a:p>
             <a:fld id="{984B7D2A-0DF8-424B-9572-B79AEBB2D9DC}" type="datetimeFigureOut">
               <a:rPr lang="en-US" noProof="0" smtClean="0"/>
-              <a:t>8/22/2025</a:t>
+              <a:t>8/23/2025</a:t>
             </a:fld>
             <a:endParaRPr lang="en-US" noProof="0" dirty="0"/>
           </a:p>
@@ -2319,7 +2319,7 @@
           <a:p>
             <a:fld id="{984B7D2A-0DF8-424B-9572-B79AEBB2D9DC}" type="datetimeFigureOut">
               <a:rPr lang="en-US" noProof="0" smtClean="0"/>
-              <a:t>8/22/2025</a:t>
+              <a:t>8/23/2025</a:t>
             </a:fld>
             <a:endParaRPr lang="en-US" noProof="0" dirty="0"/>
           </a:p>
@@ -3000,7 +3000,7 @@
           <a:p>
             <a:fld id="{984B7D2A-0DF8-424B-9572-B79AEBB2D9DC}" type="datetimeFigureOut">
               <a:rPr lang="en-US" noProof="0" smtClean="0"/>
-              <a:t>8/22/2025</a:t>
+              <a:t>8/23/2025</a:t>
             </a:fld>
             <a:endParaRPr lang="en-US" noProof="0" dirty="0"/>
           </a:p>
@@ -3321,7 +3321,7 @@
           <a:p>
             <a:fld id="{984B7D2A-0DF8-424B-9572-B79AEBB2D9DC}" type="datetimeFigureOut">
               <a:rPr lang="en-US" noProof="0" smtClean="0"/>
-              <a:t>8/22/2025</a:t>
+              <a:t>8/23/2025</a:t>
             </a:fld>
             <a:endParaRPr lang="en-US" noProof="0" dirty="0"/>
           </a:p>
@@ -3949,7 +3949,7 @@
           <a:p>
             <a:fld id="{984B7D2A-0DF8-424B-9572-B79AEBB2D9DC}" type="datetimeFigureOut">
               <a:rPr lang="en-US" noProof="0" smtClean="0"/>
-              <a:t>8/22/2025</a:t>
+              <a:t>8/23/2025</a:t>
             </a:fld>
             <a:endParaRPr lang="en-US" noProof="0" dirty="0"/>
           </a:p>
@@ -4401,7 +4401,7 @@
           <a:p>
             <a:fld id="{984B7D2A-0DF8-424B-9572-B79AEBB2D9DC}" type="datetimeFigureOut">
               <a:rPr lang="en-US" noProof="0" smtClean="0"/>
-              <a:t>8/22/2025</a:t>
+              <a:t>8/23/2025</a:t>
             </a:fld>
             <a:endParaRPr lang="en-US" noProof="0" dirty="0"/>
           </a:p>
@@ -4799,7 +4799,7 @@
           <a:p>
             <a:fld id="{984B7D2A-0DF8-424B-9572-B79AEBB2D9DC}" type="datetimeFigureOut">
               <a:rPr lang="en-US" noProof="0" smtClean="0"/>
-              <a:t>8/22/2025</a:t>
+              <a:t>8/23/2025</a:t>
             </a:fld>
             <a:endParaRPr lang="en-US" noProof="0" dirty="0"/>
           </a:p>
@@ -5089,7 +5089,7 @@
           <a:p>
             <a:fld id="{984B7D2A-0DF8-424B-9572-B79AEBB2D9DC}" type="datetimeFigureOut">
               <a:rPr lang="en-US" noProof="0" smtClean="0"/>
-              <a:t>8/22/2025</a:t>
+              <a:t>8/23/2025</a:t>
             </a:fld>
             <a:endParaRPr lang="en-US" noProof="0" dirty="0"/>
           </a:p>
@@ -7998,10 +7998,16 @@
           <a:lstStyle/>
           <a:p>
             <a:r>
+              <a:rPr lang="en-US" sz="1600">
+                <a:latin typeface="Arial Black" panose="020B0A04020102020204" pitchFamily="34" charset="0"/>
+              </a:rPr>
+              <a:t>Input Task </a:t>
+            </a:r>
+            <a:r>
               <a:rPr lang="en-US" sz="1600" dirty="0">
                 <a:latin typeface="Arial Black" panose="020B0A04020102020204" pitchFamily="34" charset="0"/>
               </a:rPr>
-              <a:t>Input Taks Box</a:t>
+              <a:t>Box</a:t>
             </a:r>
           </a:p>
         </p:txBody>
@@ -9402,15 +9408,6 @@
 </file>
 
 <file path=customXml/item2.xml><?xml version="1.0" encoding="utf-8"?>
-<?mso-contentType ?>
-<FormTemplates xmlns="http://schemas.microsoft.com/sharepoint/v3/contenttype/forms">
-  <Display>DocumentLibraryForm</Display>
-  <Edit>DocumentLibraryForm</Edit>
-  <New>DocumentLibraryForm</New>
-</FormTemplates>
-</file>
-
-<file path=customXml/item3.xml><?xml version="1.0" encoding="utf-8"?>
 <ct:contentTypeSchema xmlns:ct="http://schemas.microsoft.com/office/2006/metadata/contentType" xmlns:ma="http://schemas.microsoft.com/office/2006/metadata/properties/metaAttributes" ct:_="" ma:_="" ma:contentTypeName="Document" ma:contentTypeID="0x0101008D839245A188F945B62736E0AE006841" ma:contentTypeVersion="5" ma:contentTypeDescription="Create a new document." ma:contentTypeScope="" ma:versionID="6a782089f3f1692db5a37ac9f41e2913">
   <xsd:schema xmlns:xsd="http://www.w3.org/2001/XMLSchema" xmlns:xs="http://www.w3.org/2001/XMLSchema" xmlns:p="http://schemas.microsoft.com/office/2006/metadata/properties" xmlns:ns3="9f30b97a-4686-4fd8-a8c2-ca49266f50d0" targetNamespace="http://schemas.microsoft.com/office/2006/metadata/properties" ma:root="true" ma:fieldsID="66dffccc60049a939bd26b4bd323c061" ns3:_="">
     <xsd:import namespace="9f30b97a-4686-4fd8-a8c2-ca49266f50d0"/>
@@ -9560,6 +9557,15 @@
 </ct:contentTypeSchema>
 </file>
 
+<file path=customXml/item3.xml><?xml version="1.0" encoding="utf-8"?>
+<?mso-contentType ?>
+<FormTemplates xmlns="http://schemas.microsoft.com/sharepoint/v3/contenttype/forms">
+  <Display>DocumentLibraryForm</Display>
+  <Edit>DocumentLibraryForm</Edit>
+  <New>DocumentLibraryForm</New>
+</FormTemplates>
+</file>
+
 <file path=customXml/itemProps1.xml><?xml version="1.0" encoding="utf-8"?>
 <ds:datastoreItem xmlns:ds="http://schemas.openxmlformats.org/officeDocument/2006/customXml" ds:itemID="{544F2E22-7656-45B3-B074-00F3CD36BA3F}">
   <ds:schemaRefs>
@@ -9577,14 +9583,6 @@
 </file>
 
 <file path=customXml/itemProps2.xml><?xml version="1.0" encoding="utf-8"?>
-<ds:datastoreItem xmlns:ds="http://schemas.openxmlformats.org/officeDocument/2006/customXml" ds:itemID="{92DF0387-C86E-4A0C-9E68-75622D6B83B6}">
-  <ds:schemaRefs>
-    <ds:schemaRef ds:uri="http://schemas.microsoft.com/sharepoint/v3/contenttype/forms"/>
-  </ds:schemaRefs>
-</ds:datastoreItem>
-</file>
-
-<file path=customXml/itemProps3.xml><?xml version="1.0" encoding="utf-8"?>
 <ds:datastoreItem xmlns:ds="http://schemas.openxmlformats.org/officeDocument/2006/customXml" ds:itemID="{0B644975-0167-4773-A948-9AD3A2471771}">
   <ds:schemaRefs>
     <ds:schemaRef ds:uri="http://schemas.microsoft.com/office/2006/metadata/contentType"/>
@@ -9600,4 +9598,12 @@
     <ds:schemaRef ds:uri="http://schemas.microsoft.com/internal/obd"/>
   </ds:schemaRefs>
 </ds:datastoreItem>
+</file>
+
+<file path=customXml/itemProps3.xml><?xml version="1.0" encoding="utf-8"?>
+<ds:datastoreItem xmlns:ds="http://schemas.openxmlformats.org/officeDocument/2006/customXml" ds:itemID="{92DF0387-C86E-4A0C-9E68-75622D6B83B6}">
+  <ds:schemaRefs>
+    <ds:schemaRef ds:uri="http://schemas.microsoft.com/sharepoint/v3/contenttype/forms"/>
+  </ds:schemaRefs>
+</ds:datastoreItem>
 </file>
</xml_diff>